<commit_message>
Added new coloring for the cov plot
</commit_message>
<xml_diff>
--- a/RA-L/pictures/pdf/newExperiment.pptx
+++ b/RA-L/pictures/pdf/newExperiment.pptx
@@ -3097,14 +3097,14 @@
       </p:grpSpPr>
       <p:pic>
         <p:nvPicPr>
-          <p:cNvPr id="60" name="Picture 59" descr="Cov_Final.eps"/>
+          <p:cNvPr id="3" name="Picture 2" descr="Cov_Final.eps"/>
           <p:cNvPicPr>
             <a:picLocks noChangeAspect="1"/>
           </p:cNvPicPr>
           <p:nvPr/>
         </p:nvPicPr>
         <p:blipFill>
-          <a:blip r:embed="rId2" cstate="screen">
+          <a:blip r:embed="rId2" cstate="email">
             <a:extLst>
               <a:ext uri="{28A0092B-C50C-407E-A947-70E740481C1C}">
                 <a14:useLocalDpi xmlns:a14="http://schemas.microsoft.com/office/drawing/2010/main"/>
@@ -3117,8 +3117,8 @@
         </p:blipFill>
         <p:spPr>
           <a:xfrm>
-            <a:off x="-123028" y="1156772"/>
-            <a:ext cx="5486400" cy="2479980"/>
+            <a:off x="-99790" y="1172580"/>
+            <a:ext cx="5424959" cy="2452208"/>
           </a:xfrm>
           <a:prstGeom prst="rect">
             <a:avLst/>
@@ -3200,11 +3200,11 @@
             <a:avLst/>
           </a:prstGeom>
           <a:solidFill>
-            <a:srgbClr val="F6F0E3"/>
+            <a:srgbClr val="F8E4AE"/>
           </a:solidFill>
           <a:ln>
             <a:solidFill>
-              <a:srgbClr val="F6F0E3"/>
+              <a:srgbClr val="F8E4AE"/>
             </a:solidFill>
           </a:ln>
         </p:spPr>
@@ -3246,11 +3246,11 @@
             <a:avLst/>
           </a:prstGeom>
           <a:solidFill>
-            <a:srgbClr val="F2F7FB"/>
+            <a:srgbClr val="A5CBE6"/>
           </a:solidFill>
           <a:ln>
             <a:solidFill>
-              <a:srgbClr val="F2F7FB"/>
+              <a:srgbClr val="A5CBE6"/>
             </a:solidFill>
           </a:ln>
         </p:spPr>
@@ -3286,7 +3286,7 @@
           <p:nvPr/>
         </p:nvPicPr>
         <p:blipFill>
-          <a:blip r:embed="rId3" cstate="screen">
+          <a:blip r:embed="rId3" cstate="email">
             <a:extLst>
               <a:ext uri="{28A0092B-C50C-407E-A947-70E740481C1C}">
                 <a14:useLocalDpi xmlns:a14="http://schemas.microsoft.com/office/drawing/2010/main"/>
@@ -3299,8 +3299,8 @@
         </p:blipFill>
         <p:spPr>
           <a:xfrm>
-            <a:off x="591594" y="235066"/>
-            <a:ext cx="1069539" cy="1071056"/>
+            <a:off x="591595" y="235066"/>
+            <a:ext cx="1041522" cy="1042999"/>
           </a:xfrm>
           <a:prstGeom prst="rect">
             <a:avLst/>
@@ -3316,7 +3316,7 @@
           <p:nvPr/>
         </p:nvPicPr>
         <p:blipFill>
-          <a:blip r:embed="rId4" cstate="screen">
+          <a:blip r:embed="rId4" cstate="email">
             <a:extLst>
               <a:ext uri="{28A0092B-C50C-407E-A947-70E740481C1C}">
                 <a14:useLocalDpi xmlns:a14="http://schemas.microsoft.com/office/drawing/2010/main"/>
@@ -3346,7 +3346,7 @@
           <p:nvPr/>
         </p:nvPicPr>
         <p:blipFill>
-          <a:blip r:embed="rId5" cstate="screen">
+          <a:blip r:embed="rId5" cstate="email">
             <a:extLst>
               <a:ext uri="{28A0092B-C50C-407E-A947-70E740481C1C}">
                 <a14:useLocalDpi xmlns:a14="http://schemas.microsoft.com/office/drawing/2010/main"/>
@@ -3376,7 +3376,7 @@
           <p:nvPr/>
         </p:nvPicPr>
         <p:blipFill>
-          <a:blip r:embed="rId6" cstate="screen">
+          <a:blip r:embed="rId6" cstate="email">
             <a:extLst>
               <a:ext uri="{28A0092B-C50C-407E-A947-70E740481C1C}">
                 <a14:useLocalDpi xmlns:a14="http://schemas.microsoft.com/office/drawing/2010/main"/>

</xml_diff>